<commit_message>
atualizando documentacao e atributos do BD
</commit_message>
<xml_diff>
--- a/Arquitetura.pptx
+++ b/Arquitetura.pptx
@@ -110,6 +110,35 @@
     </p:ext>
   </p:extLst>
 </p:presentation>
+</file>
+
+<file path=ppt/changesInfos/changesInfo1.xml><?xml version="1.0" encoding="utf-8"?>
+<pc:chgInfo xmlns:a="http://schemas.openxmlformats.org/drawingml/2006/main" xmlns:r="http://schemas.openxmlformats.org/officeDocument/2006/relationships" xmlns:ac="http://schemas.microsoft.com/office/drawing/2013/main/command" xmlns:pc="http://schemas.microsoft.com/office/powerpoint/2013/main/command">
+  <pc:docChgLst>
+    <pc:chgData name="Ruan Virginio" userId="bbbcd6cf5880efa7" providerId="LiveId" clId="{286C8854-5846-4E86-B40B-3922CD1C14C6}"/>
+    <pc:docChg chg="modSld">
+      <pc:chgData name="Ruan Virginio" userId="bbbcd6cf5880efa7" providerId="LiveId" clId="{286C8854-5846-4E86-B40B-3922CD1C14C6}" dt="2024-05-25T13:51:46.719" v="0" actId="1076"/>
+      <pc:docMkLst>
+        <pc:docMk/>
+      </pc:docMkLst>
+      <pc:sldChg chg="modSp mod">
+        <pc:chgData name="Ruan Virginio" userId="bbbcd6cf5880efa7" providerId="LiveId" clId="{286C8854-5846-4E86-B40B-3922CD1C14C6}" dt="2024-05-25T13:51:46.719" v="0" actId="1076"/>
+        <pc:sldMkLst>
+          <pc:docMk/>
+          <pc:sldMk cId="2383431779" sldId="257"/>
+        </pc:sldMkLst>
+        <pc:spChg chg="mod">
+          <ac:chgData name="Ruan Virginio" userId="bbbcd6cf5880efa7" providerId="LiveId" clId="{286C8854-5846-4E86-B40B-3922CD1C14C6}" dt="2024-05-25T13:51:46.719" v="0" actId="1076"/>
+          <ac:spMkLst>
+            <pc:docMk/>
+            <pc:sldMk cId="2383431779" sldId="257"/>
+            <ac:spMk id="183" creationId="{381C5144-BB43-4980-B30D-27B40330173F}"/>
+          </ac:spMkLst>
+        </pc:spChg>
+      </pc:sldChg>
+    </pc:docChg>
+  </pc:docChgLst>
+</pc:chgInfo>
 </file>
 
 <file path=ppt/slideLayouts/slideLayout1.xml><?xml version="1.0" encoding="utf-8"?>
@@ -6817,7 +6846,7 @@
         </p:nvSpPr>
         <p:spPr>
           <a:xfrm>
-            <a:off x="3229333" y="5679743"/>
+            <a:off x="3214795" y="5615853"/>
             <a:ext cx="1159176" cy="461665"/>
           </a:xfrm>
           <a:prstGeom prst="rect">

</xml_diff>

<commit_message>
atualizando json removendo espacos e att arquivo pptx
</commit_message>
<xml_diff>
--- a/Arquitetura.pptx
+++ b/Arquitetura.pptx
@@ -117,16 +117,24 @@
   <pc:docChgLst>
     <pc:chgData name="Ruan Virginio" userId="bbbcd6cf5880efa7" providerId="LiveId" clId="{286C8854-5846-4E86-B40B-3922CD1C14C6}"/>
     <pc:docChg chg="modSld">
-      <pc:chgData name="Ruan Virginio" userId="bbbcd6cf5880efa7" providerId="LiveId" clId="{286C8854-5846-4E86-B40B-3922CD1C14C6}" dt="2024-05-25T13:51:46.719" v="0" actId="1076"/>
+      <pc:chgData name="Ruan Virginio" userId="bbbcd6cf5880efa7" providerId="LiveId" clId="{286C8854-5846-4E86-B40B-3922CD1C14C6}" dt="2024-05-27T22:07:26.205" v="1" actId="207"/>
       <pc:docMkLst>
         <pc:docMk/>
       </pc:docMkLst>
       <pc:sldChg chg="modSp mod">
-        <pc:chgData name="Ruan Virginio" userId="bbbcd6cf5880efa7" providerId="LiveId" clId="{286C8854-5846-4E86-B40B-3922CD1C14C6}" dt="2024-05-25T13:51:46.719" v="0" actId="1076"/>
+        <pc:chgData name="Ruan Virginio" userId="bbbcd6cf5880efa7" providerId="LiveId" clId="{286C8854-5846-4E86-B40B-3922CD1C14C6}" dt="2024-05-27T22:07:26.205" v="1" actId="207"/>
         <pc:sldMkLst>
           <pc:docMk/>
           <pc:sldMk cId="2383431779" sldId="257"/>
         </pc:sldMkLst>
+        <pc:spChg chg="mod">
+          <ac:chgData name="Ruan Virginio" userId="bbbcd6cf5880efa7" providerId="LiveId" clId="{286C8854-5846-4E86-B40B-3922CD1C14C6}" dt="2024-05-27T22:07:26.205" v="1" actId="207"/>
+          <ac:spMkLst>
+            <pc:docMk/>
+            <pc:sldMk cId="2383431779" sldId="257"/>
+            <ac:spMk id="152" creationId="{613321F9-3828-231C-71DE-DB2A28657900}"/>
+          </ac:spMkLst>
+        </pc:spChg>
         <pc:spChg chg="mod">
           <ac:chgData name="Ruan Virginio" userId="bbbcd6cf5880efa7" providerId="LiveId" clId="{286C8854-5846-4E86-B40B-3922CD1C14C6}" dt="2024-05-25T13:51:46.719" v="0" actId="1076"/>
           <ac:spMkLst>
@@ -288,7 +296,7 @@
           <a:p>
             <a:fld id="{E8320CE3-2267-45C8-8E19-C223B2863780}" type="datetimeFigureOut">
               <a:rPr lang="en-US" smtClean="0"/>
-              <a:t>5/25/2024</a:t>
+              <a:t>5/27/2024</a:t>
             </a:fld>
             <a:endParaRPr lang="en-US"/>
           </a:p>
@@ -486,7 +494,7 @@
           <a:p>
             <a:fld id="{E8320CE3-2267-45C8-8E19-C223B2863780}" type="datetimeFigureOut">
               <a:rPr lang="en-US" smtClean="0"/>
-              <a:t>5/25/2024</a:t>
+              <a:t>5/27/2024</a:t>
             </a:fld>
             <a:endParaRPr lang="en-US"/>
           </a:p>
@@ -694,7 +702,7 @@
           <a:p>
             <a:fld id="{E8320CE3-2267-45C8-8E19-C223B2863780}" type="datetimeFigureOut">
               <a:rPr lang="en-US" smtClean="0"/>
-              <a:t>5/25/2024</a:t>
+              <a:t>5/27/2024</a:t>
             </a:fld>
             <a:endParaRPr lang="en-US"/>
           </a:p>
@@ -892,7 +900,7 @@
           <a:p>
             <a:fld id="{E8320CE3-2267-45C8-8E19-C223B2863780}" type="datetimeFigureOut">
               <a:rPr lang="en-US" smtClean="0"/>
-              <a:t>5/25/2024</a:t>
+              <a:t>5/27/2024</a:t>
             </a:fld>
             <a:endParaRPr lang="en-US"/>
           </a:p>
@@ -1167,7 +1175,7 @@
           <a:p>
             <a:fld id="{E8320CE3-2267-45C8-8E19-C223B2863780}" type="datetimeFigureOut">
               <a:rPr lang="en-US" smtClean="0"/>
-              <a:t>5/25/2024</a:t>
+              <a:t>5/27/2024</a:t>
             </a:fld>
             <a:endParaRPr lang="en-US"/>
           </a:p>
@@ -1432,7 +1440,7 @@
           <a:p>
             <a:fld id="{E8320CE3-2267-45C8-8E19-C223B2863780}" type="datetimeFigureOut">
               <a:rPr lang="en-US" smtClean="0"/>
-              <a:t>5/25/2024</a:t>
+              <a:t>5/27/2024</a:t>
             </a:fld>
             <a:endParaRPr lang="en-US"/>
           </a:p>
@@ -1844,7 +1852,7 @@
           <a:p>
             <a:fld id="{E8320CE3-2267-45C8-8E19-C223B2863780}" type="datetimeFigureOut">
               <a:rPr lang="en-US" smtClean="0"/>
-              <a:t>5/25/2024</a:t>
+              <a:t>5/27/2024</a:t>
             </a:fld>
             <a:endParaRPr lang="en-US"/>
           </a:p>
@@ -1985,7 +1993,7 @@
           <a:p>
             <a:fld id="{E8320CE3-2267-45C8-8E19-C223B2863780}" type="datetimeFigureOut">
               <a:rPr lang="en-US" smtClean="0"/>
-              <a:t>5/25/2024</a:t>
+              <a:t>5/27/2024</a:t>
             </a:fld>
             <a:endParaRPr lang="en-US"/>
           </a:p>
@@ -2098,7 +2106,7 @@
           <a:p>
             <a:fld id="{E8320CE3-2267-45C8-8E19-C223B2863780}" type="datetimeFigureOut">
               <a:rPr lang="en-US" smtClean="0"/>
-              <a:t>5/25/2024</a:t>
+              <a:t>5/27/2024</a:t>
             </a:fld>
             <a:endParaRPr lang="en-US"/>
           </a:p>
@@ -2409,7 +2417,7 @@
           <a:p>
             <a:fld id="{E8320CE3-2267-45C8-8E19-C223B2863780}" type="datetimeFigureOut">
               <a:rPr lang="en-US" smtClean="0"/>
-              <a:t>5/25/2024</a:t>
+              <a:t>5/27/2024</a:t>
             </a:fld>
             <a:endParaRPr lang="en-US"/>
           </a:p>
@@ -2697,7 +2705,7 @@
           <a:p>
             <a:fld id="{E8320CE3-2267-45C8-8E19-C223B2863780}" type="datetimeFigureOut">
               <a:rPr lang="en-US" smtClean="0"/>
-              <a:t>5/25/2024</a:t>
+              <a:t>5/27/2024</a:t>
             </a:fld>
             <a:endParaRPr lang="en-US"/>
           </a:p>
@@ -2938,7 +2946,7 @@
           <a:p>
             <a:fld id="{E8320CE3-2267-45C8-8E19-C223B2863780}" type="datetimeFigureOut">
               <a:rPr lang="en-US" smtClean="0"/>
-              <a:t>5/25/2024</a:t>
+              <a:t>5/27/2024</a:t>
             </a:fld>
             <a:endParaRPr lang="en-US"/>
           </a:p>
@@ -8378,7 +8386,7 @@
             <a:avLst/>
           </a:prstGeom>
           <a:blipFill dpi="0" rotWithShape="1">
-            <a:blip r:embed="rId3">
+            <a:blip r:embed="rId4">
               <a:extLst>
                 <a:ext uri="{28A0092B-C50C-407E-A947-70E740481C1C}">
                   <a14:useLocalDpi xmlns:a14="http://schemas.microsoft.com/office/drawing/2010/main" val="0"/>
@@ -8442,13 +8450,13 @@
             <a:avLst/>
           </a:prstGeom>
           <a:blipFill dpi="0" rotWithShape="1">
-            <a:blip r:embed="rId4">
+            <a:blip r:embed="rId5">
               <a:extLst>
                 <a:ext uri="{28A0092B-C50C-407E-A947-70E740481C1C}">
                   <a14:useLocalDpi xmlns:a14="http://schemas.microsoft.com/office/drawing/2010/main" val="0"/>
                 </a:ext>
                 <a:ext uri="{96DAC541-7B7A-43D3-8B79-37D633B846F1}">
-                  <asvg:svgBlip xmlns:asvg="http://schemas.microsoft.com/office/drawing/2016/SVG/main" r:embed="rId5"/>
+                  <asvg:svgBlip xmlns:asvg="http://schemas.microsoft.com/office/drawing/2016/SVG/main" r:embed="rId6"/>
                 </a:ext>
               </a:extLst>
             </a:blip>

</xml_diff>